<commit_message>
fixed errors in presentation files
</commit_message>
<xml_diff>
--- a/7.28AppDemo/Presentation2.pptx
+++ b/7.28AppDemo/Presentation2.pptx
@@ -18637,14 +18637,7 @@
                 <a:latin typeface="+mj-lt"/>
                 <a:ea typeface="Century Gothic"/>
               </a:rPr>
-              <a:t>By </a:t>
-            </a:r>
-            <a:r>
-              <a:rPr kumimoji="1" lang="en-US" altLang="ja-JP" dirty="0" smtClean="0">
-                <a:latin typeface="+mj-lt"/>
-                <a:ea typeface="Century Gothic"/>
-              </a:rPr>
-              <a:t>Gary</a:t>
+              <a:t>By Gary</a:t>
             </a:r>
             <a:r>
               <a:rPr kumimoji="1" lang="ja-JP" altLang="en-US" dirty="0" smtClean="0">
@@ -18665,21 +18658,7 @@
                 <a:latin typeface="+mj-lt"/>
                 <a:ea typeface="Century Gothic"/>
               </a:rPr>
-              <a:t> </a:t>
-            </a:r>
-            <a:r>
-              <a:rPr kumimoji="1" lang="en-US" altLang="ja-JP" dirty="0" smtClean="0">
-                <a:latin typeface="+mj-lt"/>
-                <a:ea typeface="Century Gothic"/>
-              </a:rPr>
-              <a:t>and </a:t>
-            </a:r>
-            <a:r>
-              <a:rPr kumimoji="1" lang="en-US" altLang="ja-JP" dirty="0" smtClean="0">
-                <a:latin typeface="+mj-lt"/>
-                <a:ea typeface="Century Gothic"/>
-              </a:rPr>
-              <a:t>Jerry</a:t>
+              <a:t> and Jerry</a:t>
             </a:r>
             <a:r>
               <a:rPr kumimoji="1" lang="ja-JP" altLang="ja-JP" dirty="0">
@@ -18720,14 +18699,7 @@
                 <a:latin typeface="+mj-lt"/>
                 <a:ea typeface="Century Gothic"/>
               </a:rPr>
-              <a:t>CS499s1 </a:t>
-            </a:r>
-            <a:r>
-              <a:rPr kumimoji="1" lang="en-US" altLang="ja-JP" dirty="0" smtClean="0">
-                <a:latin typeface="+mj-lt"/>
-                <a:ea typeface="Century Gothic"/>
-              </a:rPr>
-              <a:t>July 2016</a:t>
+              <a:t>CS499s1 July 2016</a:t>
             </a:r>
             <a:endParaRPr kumimoji="1" lang="ja-JP" altLang="en-US" dirty="0">
               <a:latin typeface="+mj-lt"/>
@@ -18766,32 +18738,9 @@
           <a:chExt cx="0" cy="0"/>
         </a:xfrm>
       </p:grpSpPr>
-      <p:sp>
-        <p:nvSpPr>
-          <p:cNvPr id="2" name="Title 1"/>
-          <p:cNvSpPr>
-            <a:spLocks noGrp="1"/>
-          </p:cNvSpPr>
-          <p:nvPr>
-            <p:ph type="title"/>
-          </p:nvPr>
-        </p:nvSpPr>
-        <p:spPr/>
-        <p:txBody>
-          <a:bodyPr/>
-          <a:lstStyle/>
-          <a:p>
-            <a:r>
-              <a:rPr kumimoji="1" lang="en-US" altLang="ja-JP" dirty="0" smtClean="0"/>
-              <a:t>Route 5</a:t>
-            </a:r>
-            <a:endParaRPr kumimoji="1" lang="ja-JP" altLang="en-US" dirty="0"/>
-          </a:p>
-        </p:txBody>
-      </p:sp>
       <p:pic>
         <p:nvPicPr>
-          <p:cNvPr id="5" name="Content Placeholder 4" descr="Screen Shot 2016-07-27 at 8.21.56 PM.png"/>
+          <p:cNvPr id="15" name="Content Placeholder 14" descr="Screen Shot 2016-07-28 at 2.00.32 PM.png"/>
           <p:cNvPicPr>
             <a:picLocks noGrp="1" noChangeAspect="1"/>
           </p:cNvPicPr>
@@ -18807,18 +18756,251 @@
               </a:ext>
             </a:extLst>
           </a:blip>
-          <a:srcRect t="-27009" b="-27009"/>
+          <a:srcRect t="-27282" b="-27282"/>
           <a:stretch>
             <a:fillRect/>
           </a:stretch>
         </p:blipFill>
         <p:spPr>
           <a:xfrm>
-            <a:off x="4504766" y="762000"/>
+            <a:off x="4404729" y="857944"/>
             <a:ext cx="4258234" cy="5257800"/>
           </a:xfrm>
         </p:spPr>
       </p:pic>
+      <p:sp>
+        <p:nvSpPr>
+          <p:cNvPr id="8" name="TextBox 7"/>
+          <p:cNvSpPr txBox="1"/>
+          <p:nvPr/>
+        </p:nvSpPr>
+        <p:spPr>
+          <a:xfrm>
+            <a:off x="5517710" y="2075326"/>
+            <a:ext cx="1016136" cy="369332"/>
+          </a:xfrm>
+          <a:prstGeom prst="rect">
+            <a:avLst/>
+          </a:prstGeom>
+          <a:noFill/>
+        </p:spPr>
+        <p:txBody>
+          <a:bodyPr wrap="none" rtlCol="0">
+            <a:spAutoFit/>
+          </a:bodyPr>
+          <a:lstStyle/>
+          <a:p>
+            <a:r>
+              <a:rPr kumimoji="1" lang="en-US" altLang="ja-JP" dirty="0" smtClean="0"/>
+              <a:t>2.82172</a:t>
+            </a:r>
+            <a:endParaRPr kumimoji="1" lang="ja-JP" altLang="en-US" dirty="0"/>
+          </a:p>
+        </p:txBody>
+      </p:sp>
+      <p:sp>
+        <p:nvSpPr>
+          <p:cNvPr id="9" name="TextBox 8"/>
+          <p:cNvSpPr txBox="1"/>
+          <p:nvPr/>
+        </p:nvSpPr>
+        <p:spPr>
+          <a:xfrm>
+            <a:off x="6405919" y="2558534"/>
+            <a:ext cx="1016136" cy="369332"/>
+          </a:xfrm>
+          <a:prstGeom prst="rect">
+            <a:avLst/>
+          </a:prstGeom>
+          <a:noFill/>
+        </p:spPr>
+        <p:txBody>
+          <a:bodyPr wrap="none" rtlCol="0">
+            <a:spAutoFit/>
+          </a:bodyPr>
+          <a:lstStyle/>
+          <a:p>
+            <a:r>
+              <a:rPr kumimoji="1" lang="en-US" altLang="ja-JP" dirty="0" smtClean="0"/>
+              <a:t>2.59501</a:t>
+            </a:r>
+            <a:endParaRPr kumimoji="1" lang="ja-JP" altLang="en-US" dirty="0"/>
+          </a:p>
+        </p:txBody>
+      </p:sp>
+      <p:sp>
+        <p:nvSpPr>
+          <p:cNvPr id="10" name="TextBox 9"/>
+          <p:cNvSpPr txBox="1"/>
+          <p:nvPr/>
+        </p:nvSpPr>
+        <p:spPr>
+          <a:xfrm>
+            <a:off x="7350288" y="2964458"/>
+            <a:ext cx="1016136" cy="369332"/>
+          </a:xfrm>
+          <a:prstGeom prst="rect">
+            <a:avLst/>
+          </a:prstGeom>
+          <a:noFill/>
+        </p:spPr>
+        <p:txBody>
+          <a:bodyPr wrap="none" rtlCol="0">
+            <a:spAutoFit/>
+          </a:bodyPr>
+          <a:lstStyle/>
+          <a:p>
+            <a:r>
+              <a:rPr kumimoji="1" lang="en-US" altLang="ja-JP" dirty="0" smtClean="0"/>
+              <a:t>2.22854</a:t>
+            </a:r>
+            <a:endParaRPr kumimoji="1" lang="ja-JP" altLang="en-US" dirty="0"/>
+          </a:p>
+        </p:txBody>
+      </p:sp>
+      <p:sp>
+        <p:nvSpPr>
+          <p:cNvPr id="11" name="TextBox 10"/>
+          <p:cNvSpPr txBox="1"/>
+          <p:nvPr/>
+        </p:nvSpPr>
+        <p:spPr>
+          <a:xfrm>
+            <a:off x="8011110" y="3856176"/>
+            <a:ext cx="632355" cy="369332"/>
+          </a:xfrm>
+          <a:prstGeom prst="rect">
+            <a:avLst/>
+          </a:prstGeom>
+          <a:noFill/>
+        </p:spPr>
+        <p:txBody>
+          <a:bodyPr wrap="none" rtlCol="0">
+            <a:spAutoFit/>
+          </a:bodyPr>
+          <a:lstStyle/>
+          <a:p>
+            <a:r>
+              <a:rPr kumimoji="1" lang="en-US" altLang="ja-JP" dirty="0" smtClean="0"/>
+              <a:t>.049</a:t>
+            </a:r>
+            <a:endParaRPr kumimoji="1" lang="ja-JP" altLang="en-US" dirty="0"/>
+          </a:p>
+        </p:txBody>
+      </p:sp>
+      <p:sp>
+        <p:nvSpPr>
+          <p:cNvPr id="12" name="TextBox 11"/>
+          <p:cNvSpPr txBox="1"/>
+          <p:nvPr/>
+        </p:nvSpPr>
+        <p:spPr>
+          <a:xfrm>
+            <a:off x="6702320" y="4143171"/>
+            <a:ext cx="1016136" cy="369332"/>
+          </a:xfrm>
+          <a:prstGeom prst="rect">
+            <a:avLst/>
+          </a:prstGeom>
+          <a:noFill/>
+        </p:spPr>
+        <p:txBody>
+          <a:bodyPr wrap="none" rtlCol="0">
+            <a:spAutoFit/>
+          </a:bodyPr>
+          <a:lstStyle/>
+          <a:p>
+            <a:r>
+              <a:rPr kumimoji="1" lang="en-US" altLang="ja-JP" dirty="0" smtClean="0"/>
+              <a:t>2.24163</a:t>
+            </a:r>
+            <a:endParaRPr kumimoji="1" lang="ja-JP" altLang="en-US" dirty="0"/>
+          </a:p>
+        </p:txBody>
+      </p:sp>
+      <p:sp>
+        <p:nvSpPr>
+          <p:cNvPr id="13" name="TextBox 12"/>
+          <p:cNvSpPr txBox="1"/>
+          <p:nvPr/>
+        </p:nvSpPr>
+        <p:spPr>
+          <a:xfrm>
+            <a:off x="5645637" y="3486844"/>
+            <a:ext cx="888209" cy="369332"/>
+          </a:xfrm>
+          <a:prstGeom prst="rect">
+            <a:avLst/>
+          </a:prstGeom>
+          <a:noFill/>
+        </p:spPr>
+        <p:txBody>
+          <a:bodyPr wrap="none" rtlCol="0">
+            <a:spAutoFit/>
+          </a:bodyPr>
+          <a:lstStyle/>
+          <a:p>
+            <a:r>
+              <a:rPr kumimoji="1" lang="en-US" altLang="ja-JP" dirty="0" smtClean="0"/>
+              <a:t>2.7180</a:t>
+            </a:r>
+            <a:endParaRPr kumimoji="1" lang="ja-JP" altLang="en-US" dirty="0"/>
+          </a:p>
+        </p:txBody>
+      </p:sp>
+      <p:sp>
+        <p:nvSpPr>
+          <p:cNvPr id="14" name="TextBox 13"/>
+          <p:cNvSpPr txBox="1"/>
+          <p:nvPr/>
+        </p:nvSpPr>
+        <p:spPr>
+          <a:xfrm>
+            <a:off x="4757428" y="2964458"/>
+            <a:ext cx="760282" cy="369332"/>
+          </a:xfrm>
+          <a:prstGeom prst="rect">
+            <a:avLst/>
+          </a:prstGeom>
+          <a:noFill/>
+        </p:spPr>
+        <p:txBody>
+          <a:bodyPr wrap="none" rtlCol="0">
+            <a:spAutoFit/>
+          </a:bodyPr>
+          <a:lstStyle/>
+          <a:p>
+            <a:r>
+              <a:rPr kumimoji="1" lang="en-US" altLang="ja-JP" dirty="0" smtClean="0"/>
+              <a:t>4.037</a:t>
+            </a:r>
+            <a:endParaRPr kumimoji="1" lang="ja-JP" altLang="en-US" dirty="0"/>
+          </a:p>
+        </p:txBody>
+      </p:sp>
+      <p:sp>
+        <p:nvSpPr>
+          <p:cNvPr id="2" name="Title 1"/>
+          <p:cNvSpPr>
+            <a:spLocks noGrp="1"/>
+          </p:cNvSpPr>
+          <p:nvPr>
+            <p:ph type="title"/>
+          </p:nvPr>
+        </p:nvSpPr>
+        <p:spPr/>
+        <p:txBody>
+          <a:bodyPr/>
+          <a:lstStyle/>
+          <a:p>
+            <a:r>
+              <a:rPr kumimoji="1" lang="en-US" altLang="ja-JP" dirty="0" smtClean="0"/>
+              <a:t>Route 5</a:t>
+            </a:r>
+            <a:endParaRPr kumimoji="1" lang="ja-JP" altLang="en-US" dirty="0"/>
+          </a:p>
+        </p:txBody>
+      </p:sp>
       <p:sp>
         <p:nvSpPr>
           <p:cNvPr id="4" name="Text Placeholder 3"/>
@@ -18842,9 +19024,32 @@
           </a:p>
         </p:txBody>
       </p:sp>
+      <p:sp>
+        <p:nvSpPr>
+          <p:cNvPr id="3" name="Slide Number Placeholder 2"/>
+          <p:cNvSpPr>
+            <a:spLocks noGrp="1"/>
+          </p:cNvSpPr>
+          <p:nvPr>
+            <p:ph type="sldNum" sz="quarter" idx="12"/>
+          </p:nvPr>
+        </p:nvSpPr>
+        <p:spPr/>
+        <p:txBody>
+          <a:bodyPr/>
+          <a:lstStyle/>
+          <a:p>
+            <a:fld id="{4382A7F7-08BF-4252-8141-63FB96055BBB}" type="slidenum">
+              <a:rPr lang="en-US" smtClean="0"/>
+              <a:t>10</a:t>
+            </a:fld>
+            <a:endParaRPr lang="en-US"/>
+          </a:p>
+        </p:txBody>
+      </p:sp>
       <p:pic>
         <p:nvPicPr>
-          <p:cNvPr id="6" name="Picture 5" descr="Screen Shot 2016-07-27 at 8.21.46 PM.png"/>
+          <p:cNvPr id="16" name="Picture 15" descr="Screen Shot 2016-07-28 at 2.00.43 PM.png"/>
           <p:cNvPicPr>
             <a:picLocks noChangeAspect="1"/>
           </p:cNvPicPr>
@@ -18864,247 +19069,14 @@
         </p:blipFill>
         <p:spPr>
           <a:xfrm>
-            <a:off x="4899635" y="4512503"/>
-            <a:ext cx="3632200" cy="1181100"/>
+            <a:off x="4602519" y="4879391"/>
+            <a:ext cx="3606800" cy="1435100"/>
           </a:xfrm>
           <a:prstGeom prst="rect">
             <a:avLst/>
           </a:prstGeom>
         </p:spPr>
       </p:pic>
-      <p:sp>
-        <p:nvSpPr>
-          <p:cNvPr id="3" name="Slide Number Placeholder 2"/>
-          <p:cNvSpPr>
-            <a:spLocks noGrp="1"/>
-          </p:cNvSpPr>
-          <p:nvPr>
-            <p:ph type="sldNum" sz="quarter" idx="12"/>
-          </p:nvPr>
-        </p:nvSpPr>
-        <p:spPr/>
-        <p:txBody>
-          <a:bodyPr/>
-          <a:lstStyle/>
-          <a:p>
-            <a:fld id="{4382A7F7-08BF-4252-8141-63FB96055BBB}" type="slidenum">
-              <a:rPr lang="en-US" smtClean="0"/>
-              <a:t>10</a:t>
-            </a:fld>
-            <a:endParaRPr lang="en-US"/>
-          </a:p>
-        </p:txBody>
-      </p:sp>
-      <p:sp>
-        <p:nvSpPr>
-          <p:cNvPr id="8" name="TextBox 7"/>
-          <p:cNvSpPr txBox="1"/>
-          <p:nvPr/>
-        </p:nvSpPr>
-        <p:spPr>
-          <a:xfrm>
-            <a:off x="5628203" y="2075326"/>
-            <a:ext cx="1016136" cy="369332"/>
-          </a:xfrm>
-          <a:prstGeom prst="rect">
-            <a:avLst/>
-          </a:prstGeom>
-          <a:noFill/>
-        </p:spPr>
-        <p:txBody>
-          <a:bodyPr wrap="none" rtlCol="0">
-            <a:spAutoFit/>
-          </a:bodyPr>
-          <a:lstStyle/>
-          <a:p>
-            <a:r>
-              <a:rPr kumimoji="1" lang="en-US" altLang="ja-JP" dirty="0" smtClean="0"/>
-              <a:t>2.82172</a:t>
-            </a:r>
-            <a:endParaRPr kumimoji="1" lang="ja-JP" altLang="en-US" dirty="0"/>
-          </a:p>
-        </p:txBody>
-      </p:sp>
-      <p:sp>
-        <p:nvSpPr>
-          <p:cNvPr id="9" name="TextBox 8"/>
-          <p:cNvSpPr txBox="1"/>
-          <p:nvPr/>
-        </p:nvSpPr>
-        <p:spPr>
-          <a:xfrm>
-            <a:off x="6644339" y="2558534"/>
-            <a:ext cx="1016136" cy="369332"/>
-          </a:xfrm>
-          <a:prstGeom prst="rect">
-            <a:avLst/>
-          </a:prstGeom>
-          <a:noFill/>
-        </p:spPr>
-        <p:txBody>
-          <a:bodyPr wrap="none" rtlCol="0">
-            <a:spAutoFit/>
-          </a:bodyPr>
-          <a:lstStyle/>
-          <a:p>
-            <a:r>
-              <a:rPr kumimoji="1" lang="en-US" altLang="ja-JP" dirty="0" smtClean="0"/>
-              <a:t>2.59501</a:t>
-            </a:r>
-            <a:endParaRPr kumimoji="1" lang="ja-JP" altLang="en-US" dirty="0"/>
-          </a:p>
-        </p:txBody>
-      </p:sp>
-      <p:sp>
-        <p:nvSpPr>
-          <p:cNvPr id="10" name="TextBox 9"/>
-          <p:cNvSpPr txBox="1"/>
-          <p:nvPr/>
-        </p:nvSpPr>
-        <p:spPr>
-          <a:xfrm>
-            <a:off x="7515699" y="3056370"/>
-            <a:ext cx="1016136" cy="369332"/>
-          </a:xfrm>
-          <a:prstGeom prst="rect">
-            <a:avLst/>
-          </a:prstGeom>
-          <a:noFill/>
-        </p:spPr>
-        <p:txBody>
-          <a:bodyPr wrap="none" rtlCol="0">
-            <a:spAutoFit/>
-          </a:bodyPr>
-          <a:lstStyle/>
-          <a:p>
-            <a:r>
-              <a:rPr kumimoji="1" lang="en-US" altLang="ja-JP" dirty="0" smtClean="0"/>
-              <a:t>2.22854</a:t>
-            </a:r>
-            <a:endParaRPr kumimoji="1" lang="ja-JP" altLang="en-US" dirty="0"/>
-          </a:p>
-        </p:txBody>
-      </p:sp>
-      <p:sp>
-        <p:nvSpPr>
-          <p:cNvPr id="11" name="TextBox 10"/>
-          <p:cNvSpPr txBox="1"/>
-          <p:nvPr/>
-        </p:nvSpPr>
-        <p:spPr>
-          <a:xfrm>
-            <a:off x="8140900" y="3852748"/>
-            <a:ext cx="632355" cy="369332"/>
-          </a:xfrm>
-          <a:prstGeom prst="rect">
-            <a:avLst/>
-          </a:prstGeom>
-          <a:noFill/>
-        </p:spPr>
-        <p:txBody>
-          <a:bodyPr wrap="none" rtlCol="0">
-            <a:spAutoFit/>
-          </a:bodyPr>
-          <a:lstStyle/>
-          <a:p>
-            <a:r>
-              <a:rPr kumimoji="1" lang="en-US" altLang="ja-JP" dirty="0" smtClean="0"/>
-              <a:t>.049</a:t>
-            </a:r>
-            <a:endParaRPr kumimoji="1" lang="ja-JP" altLang="en-US" dirty="0"/>
-          </a:p>
-        </p:txBody>
-      </p:sp>
-      <p:sp>
-        <p:nvSpPr>
-          <p:cNvPr id="12" name="TextBox 11"/>
-          <p:cNvSpPr txBox="1"/>
-          <p:nvPr/>
-        </p:nvSpPr>
-        <p:spPr>
-          <a:xfrm>
-            <a:off x="6913987" y="4037414"/>
-            <a:ext cx="1016136" cy="369332"/>
-          </a:xfrm>
-          <a:prstGeom prst="rect">
-            <a:avLst/>
-          </a:prstGeom>
-          <a:noFill/>
-        </p:spPr>
-        <p:txBody>
-          <a:bodyPr wrap="none" rtlCol="0">
-            <a:spAutoFit/>
-          </a:bodyPr>
-          <a:lstStyle/>
-          <a:p>
-            <a:r>
-              <a:rPr kumimoji="1" lang="en-US" altLang="ja-JP" dirty="0" smtClean="0"/>
-              <a:t>2.24163</a:t>
-            </a:r>
-            <a:endParaRPr kumimoji="1" lang="ja-JP" altLang="en-US" dirty="0"/>
-          </a:p>
-        </p:txBody>
-      </p:sp>
-      <p:sp>
-        <p:nvSpPr>
-          <p:cNvPr id="13" name="TextBox 12"/>
-          <p:cNvSpPr txBox="1"/>
-          <p:nvPr/>
-        </p:nvSpPr>
-        <p:spPr>
-          <a:xfrm>
-            <a:off x="6025778" y="3486844"/>
-            <a:ext cx="888209" cy="369332"/>
-          </a:xfrm>
-          <a:prstGeom prst="rect">
-            <a:avLst/>
-          </a:prstGeom>
-          <a:noFill/>
-        </p:spPr>
-        <p:txBody>
-          <a:bodyPr wrap="none" rtlCol="0">
-            <a:spAutoFit/>
-          </a:bodyPr>
-          <a:lstStyle/>
-          <a:p>
-            <a:r>
-              <a:rPr kumimoji="1" lang="en-US" altLang="ja-JP" dirty="0" smtClean="0"/>
-              <a:t>2.7180</a:t>
-            </a:r>
-            <a:endParaRPr kumimoji="1" lang="ja-JP" altLang="en-US" dirty="0"/>
-          </a:p>
-        </p:txBody>
-      </p:sp>
-      <p:sp>
-        <p:nvSpPr>
-          <p:cNvPr id="14" name="TextBox 13"/>
-          <p:cNvSpPr txBox="1"/>
-          <p:nvPr/>
-        </p:nvSpPr>
-        <p:spPr>
-          <a:xfrm>
-            <a:off x="5095142" y="2927866"/>
-            <a:ext cx="760282" cy="369332"/>
-          </a:xfrm>
-          <a:prstGeom prst="rect">
-            <a:avLst/>
-          </a:prstGeom>
-          <a:noFill/>
-        </p:spPr>
-        <p:txBody>
-          <a:bodyPr wrap="none" rtlCol="0">
-            <a:spAutoFit/>
-          </a:bodyPr>
-          <a:lstStyle/>
-          <a:p>
-            <a:r>
-              <a:rPr kumimoji="1" lang="en-US" altLang="ja-JP" dirty="0" smtClean="0"/>
-              <a:t>4.037</a:t>
-            </a:r>
-            <a:endParaRPr kumimoji="1" lang="ja-JP" altLang="en-US" dirty="0"/>
-          </a:p>
-        </p:txBody>
-      </p:sp>
     </p:spTree>
     <p:extLst>
       <p:ext uri="{BB962C8B-B14F-4D97-AF65-F5344CB8AC3E}">
@@ -19205,21 +19177,11 @@
           <a:p>
             <a:r>
               <a:rPr kumimoji="1" lang="en-US" altLang="ja-JP" dirty="0" smtClean="0"/>
-              <a:t>Goes through points 12, 13, 23, 33, 43, 53, 52, 42, 32, 22, 21</a:t>
+              <a:t>Goes through points 12, 13, 23, 33, 43, 53, 52, 42, 32, 22, </a:t>
             </a:r>
-            <a:br>
-              <a:rPr kumimoji="1" lang="en-US" altLang="ja-JP" dirty="0" smtClean="0"/>
-            </a:br>
             <a:r>
               <a:rPr kumimoji="1" lang="en-US" altLang="ja-JP" dirty="0" smtClean="0"/>
-              <a:t/>
-            </a:r>
-            <a:br>
-              <a:rPr kumimoji="1" lang="en-US" altLang="ja-JP" dirty="0" smtClean="0"/>
-            </a:br>
-            <a:r>
-              <a:rPr kumimoji="1" lang="en-US" altLang="ja-JP" dirty="0" smtClean="0"/>
-              <a:t>Also makes a circuit</a:t>
+              <a:t>21</a:t>
             </a:r>
             <a:endParaRPr kumimoji="1" lang="ja-JP" altLang="en-US" dirty="0"/>
           </a:p>
@@ -19339,36 +19301,6 @@
           </a:p>
         </p:txBody>
       </p:sp>
-      <p:pic>
-        <p:nvPicPr>
-          <p:cNvPr id="5" name="Content Placeholder 4" descr="Screen Shot 2016-07-28 at 12.07.05 AM.png"/>
-          <p:cNvPicPr>
-            <a:picLocks noGrp="1" noChangeAspect="1"/>
-          </p:cNvPicPr>
-          <p:nvPr>
-            <p:ph idx="1"/>
-          </p:nvPr>
-        </p:nvPicPr>
-        <p:blipFill>
-          <a:blip r:embed="rId2">
-            <a:extLst>
-              <a:ext uri="{28A0092B-C50C-407E-A947-70E740481C1C}">
-                <a14:useLocalDpi xmlns:a14="http://schemas.microsoft.com/office/drawing/2010/main" val="0"/>
-              </a:ext>
-            </a:extLst>
-          </a:blip>
-          <a:srcRect t="-12492" b="-12492"/>
-          <a:stretch>
-            <a:fillRect/>
-          </a:stretch>
-        </p:blipFill>
-        <p:spPr>
-          <a:xfrm>
-            <a:off x="4504766" y="603173"/>
-            <a:ext cx="4258234" cy="5257800"/>
-          </a:xfrm>
-        </p:spPr>
-      </p:pic>
       <p:sp>
         <p:nvSpPr>
           <p:cNvPr id="4" name="Text Placeholder 3"/>
@@ -19416,9 +19348,62 @@
           </a:p>
         </p:txBody>
       </p:sp>
+      <p:sp>
+        <p:nvSpPr>
+          <p:cNvPr id="3" name="Slide Number Placeholder 2"/>
+          <p:cNvSpPr>
+            <a:spLocks noGrp="1"/>
+          </p:cNvSpPr>
+          <p:nvPr>
+            <p:ph type="sldNum" sz="quarter" idx="12"/>
+          </p:nvPr>
+        </p:nvSpPr>
+        <p:spPr/>
+        <p:txBody>
+          <a:bodyPr/>
+          <a:lstStyle/>
+          <a:p>
+            <a:fld id="{4382A7F7-08BF-4252-8141-63FB96055BBB}" type="slidenum">
+              <a:rPr lang="en-US" smtClean="0"/>
+              <a:t>12</a:t>
+            </a:fld>
+            <a:endParaRPr lang="en-US"/>
+          </a:p>
+        </p:txBody>
+      </p:sp>
       <p:pic>
         <p:nvPicPr>
-          <p:cNvPr id="6" name="Picture 5"/>
+          <p:cNvPr id="8" name="Content Placeholder 7" descr="Screen Shot 2016-07-28 at 2.04.01 PM.png"/>
+          <p:cNvPicPr>
+            <a:picLocks noGrp="1" noChangeAspect="1"/>
+          </p:cNvPicPr>
+          <p:nvPr>
+            <p:ph idx="1"/>
+          </p:nvPr>
+        </p:nvPicPr>
+        <p:blipFill>
+          <a:blip r:embed="rId2">
+            <a:extLst>
+              <a:ext uri="{28A0092B-C50C-407E-A947-70E740481C1C}">
+                <a14:useLocalDpi xmlns:a14="http://schemas.microsoft.com/office/drawing/2010/main" val="0"/>
+              </a:ext>
+            </a:extLst>
+          </a:blip>
+          <a:srcRect t="-14589" b="-14589"/>
+          <a:stretch>
+            <a:fillRect/>
+          </a:stretch>
+        </p:blipFill>
+        <p:spPr>
+          <a:xfrm>
+            <a:off x="4504766" y="436488"/>
+            <a:ext cx="4258234" cy="5257800"/>
+          </a:xfrm>
+        </p:spPr>
+      </p:pic>
+      <p:pic>
+        <p:nvPicPr>
+          <p:cNvPr id="9" name="Picture 8" descr="Screen Shot 2016-07-28 at 2.04.06 PM.png"/>
           <p:cNvPicPr>
             <a:picLocks noChangeAspect="1"/>
           </p:cNvPicPr>
@@ -19438,37 +19423,14 @@
         </p:blipFill>
         <p:spPr>
           <a:xfrm>
-            <a:off x="4759723" y="4809067"/>
-            <a:ext cx="3632200" cy="1210733"/>
+            <a:off x="4751917" y="4559300"/>
+            <a:ext cx="3619500" cy="1460500"/>
           </a:xfrm>
           <a:prstGeom prst="rect">
             <a:avLst/>
           </a:prstGeom>
         </p:spPr>
       </p:pic>
-      <p:sp>
-        <p:nvSpPr>
-          <p:cNvPr id="3" name="Slide Number Placeholder 2"/>
-          <p:cNvSpPr>
-            <a:spLocks noGrp="1"/>
-          </p:cNvSpPr>
-          <p:nvPr>
-            <p:ph type="sldNum" sz="quarter" idx="12"/>
-          </p:nvPr>
-        </p:nvSpPr>
-        <p:spPr/>
-        <p:txBody>
-          <a:bodyPr/>
-          <a:lstStyle/>
-          <a:p>
-            <a:fld id="{4382A7F7-08BF-4252-8141-63FB96055BBB}" type="slidenum">
-              <a:rPr lang="en-US" smtClean="0"/>
-              <a:t>12</a:t>
-            </a:fld>
-            <a:endParaRPr lang="en-US"/>
-          </a:p>
-        </p:txBody>
-      </p:sp>
     </p:spTree>
     <p:extLst>
       <p:ext uri="{BB962C8B-B14F-4D97-AF65-F5344CB8AC3E}">

</xml_diff>

<commit_message>
changed files to pdf
</commit_message>
<xml_diff>
--- a/7.28AppDemo/Presentation2.pptx
+++ b/7.28AppDemo/Presentation2.pptx
@@ -18995,7 +18995,11 @@
           <a:p>
             <a:r>
               <a:rPr kumimoji="1" lang="en-US" altLang="ja-JP" dirty="0" smtClean="0"/>
-              <a:t>Route 5</a:t>
+              <a:t>Route </a:t>
+            </a:r>
+            <a:r>
+              <a:rPr kumimoji="1" lang="en-US" altLang="ja-JP" dirty="0" smtClean="0"/>
+              <a:t>4</a:t>
             </a:r>
             <a:endParaRPr kumimoji="1" lang="ja-JP" altLang="en-US" dirty="0"/>
           </a:p>
@@ -19124,7 +19128,11 @@
           <a:p>
             <a:r>
               <a:rPr kumimoji="1" lang="en-US" altLang="ja-JP" dirty="0" smtClean="0"/>
-              <a:t>Route 7</a:t>
+              <a:t>Route </a:t>
+            </a:r>
+            <a:r>
+              <a:rPr kumimoji="1" lang="en-US" altLang="ja-JP" dirty="0" smtClean="0"/>
+              <a:t>6</a:t>
             </a:r>
             <a:endParaRPr kumimoji="1" lang="ja-JP" altLang="en-US" dirty="0"/>
           </a:p>
@@ -19177,11 +19185,7 @@
           <a:p>
             <a:r>
               <a:rPr kumimoji="1" lang="en-US" altLang="ja-JP" dirty="0" smtClean="0"/>
-              <a:t>Goes through points 12, 13, 23, 33, 43, 53, 52, 42, 32, 22, </a:t>
-            </a:r>
-            <a:r>
-              <a:rPr kumimoji="1" lang="en-US" altLang="ja-JP" dirty="0" smtClean="0"/>
-              <a:t>21</a:t>
+              <a:t>Goes through points 12, 13, 23, 33, 43, 53, 52, 42, 32, 22, 21</a:t>
             </a:r>
             <a:endParaRPr kumimoji="1" lang="ja-JP" altLang="en-US" dirty="0"/>
           </a:p>
@@ -19295,7 +19299,11 @@
             </a:r>
             <a:r>
               <a:rPr kumimoji="1" lang="en-US" altLang="ja-JP" dirty="0" smtClean="0"/>
-              <a:t>11</a:t>
+              <a:t>1</a:t>
+            </a:r>
+            <a:r>
+              <a:rPr kumimoji="1" lang="en-US" altLang="ja-JP" dirty="0" smtClean="0"/>
+              <a:t>0</a:t>
             </a:r>
             <a:endParaRPr kumimoji="1" lang="ja-JP" altLang="en-US" dirty="0"/>
           </a:p>
@@ -20362,7 +20370,7 @@
         </p:nvSpPr>
         <p:spPr>
           <a:xfrm>
-            <a:off x="484975" y="1726267"/>
+            <a:off x="484975" y="2953934"/>
             <a:ext cx="7471500" cy="4724400"/>
           </a:xfrm>
           <a:prstGeom prst="rect">
@@ -20460,7 +20468,7 @@
         </p:nvSpPr>
         <p:spPr>
           <a:xfrm>
-            <a:off x="571900" y="369867"/>
+            <a:off x="571900" y="1597534"/>
             <a:ext cx="4684500" cy="1356400"/>
           </a:xfrm>
           <a:prstGeom prst="rect">
@@ -20491,6 +20499,29 @@
               </a:rPr>
               <a:t>Path Finding</a:t>
             </a:r>
+          </a:p>
+        </p:txBody>
+      </p:sp>
+      <p:sp>
+        <p:nvSpPr>
+          <p:cNvPr id="3" name="Slide Number Placeholder 2"/>
+          <p:cNvSpPr>
+            <a:spLocks noGrp="1"/>
+          </p:cNvSpPr>
+          <p:nvPr>
+            <p:ph type="sldNum" sz="quarter" idx="12"/>
+          </p:nvPr>
+        </p:nvSpPr>
+        <p:spPr/>
+        <p:txBody>
+          <a:bodyPr/>
+          <a:lstStyle/>
+          <a:p>
+            <a:fld id="{4382A7F7-08BF-4252-8141-63FB96055BBB}" type="slidenum">
+              <a:rPr lang="en-US" smtClean="0"/>
+              <a:t>6</a:t>
+            </a:fld>
+            <a:endParaRPr lang="en-US"/>
           </a:p>
         </p:txBody>
       </p:sp>
@@ -20531,13 +20562,13 @@
             <a:spLocks noGrp="1"/>
           </p:cNvSpPr>
           <p:nvPr>
-            <p:ph type="subTitle" idx="1"/>
+            <p:ph type="subTitle" idx="4294967295"/>
           </p:nvPr>
         </p:nvSpPr>
         <p:spPr>
           <a:xfrm>
-            <a:off x="229300" y="153667"/>
-            <a:ext cx="8520600" cy="740800"/>
+            <a:off x="1086555" y="154692"/>
+            <a:ext cx="7323667" cy="739775"/>
           </a:xfrm>
           <a:prstGeom prst="rect">
             <a:avLst/>
@@ -20951,6 +20982,29 @@
               <a:buNone/>
             </a:pPr>
             <a:endParaRPr dirty="0"/>
+          </a:p>
+        </p:txBody>
+      </p:sp>
+      <p:sp>
+        <p:nvSpPr>
+          <p:cNvPr id="3" name="Slide Number Placeholder 2"/>
+          <p:cNvSpPr>
+            <a:spLocks noGrp="1"/>
+          </p:cNvSpPr>
+          <p:nvPr>
+            <p:ph type="sldNum" sz="quarter" idx="12"/>
+          </p:nvPr>
+        </p:nvSpPr>
+        <p:spPr/>
+        <p:txBody>
+          <a:bodyPr/>
+          <a:lstStyle/>
+          <a:p>
+            <a:fld id="{4382A7F7-08BF-4252-8141-63FB96055BBB}" type="slidenum">
+              <a:rPr lang="en-US" smtClean="0"/>
+              <a:t>7</a:t>
+            </a:fld>
+            <a:endParaRPr lang="en-US"/>
           </a:p>
         </p:txBody>
       </p:sp>
@@ -20991,13 +21045,13 @@
             <a:spLocks noGrp="1"/>
           </p:cNvSpPr>
           <p:nvPr>
-            <p:ph type="subTitle" idx="1"/>
+            <p:ph type="subTitle" idx="4294967295"/>
           </p:nvPr>
         </p:nvSpPr>
         <p:spPr>
           <a:xfrm>
-            <a:off x="205775" y="122300"/>
-            <a:ext cx="8520600" cy="1056800"/>
+            <a:off x="1820334" y="234174"/>
+            <a:ext cx="6237111" cy="1057275"/>
           </a:xfrm>
           <a:prstGeom prst="rect">
             <a:avLst/>
@@ -21281,6 +21335,29 @@
           </a:ln>
         </p:spPr>
       </p:pic>
+      <p:sp>
+        <p:nvSpPr>
+          <p:cNvPr id="2" name="Slide Number Placeholder 1"/>
+          <p:cNvSpPr>
+            <a:spLocks noGrp="1"/>
+          </p:cNvSpPr>
+          <p:nvPr>
+            <p:ph type="sldNum" sz="quarter" idx="12"/>
+          </p:nvPr>
+        </p:nvSpPr>
+        <p:spPr/>
+        <p:txBody>
+          <a:bodyPr/>
+          <a:lstStyle/>
+          <a:p>
+            <a:fld id="{4382A7F7-08BF-4252-8141-63FB96055BBB}" type="slidenum">
+              <a:rPr lang="en-US" smtClean="0"/>
+              <a:t>8</a:t>
+            </a:fld>
+            <a:endParaRPr lang="en-US"/>
+          </a:p>
+        </p:txBody>
+      </p:sp>
     </p:spTree>
     <p:extLst>
       <p:ext uri="{BB962C8B-B14F-4D97-AF65-F5344CB8AC3E}">

</xml_diff>